<commit_message>
got radar chart to work
</commit_message>
<xml_diff>
--- a/SMILE.pptx
+++ b/SMILE.pptx
@@ -5860,10 +5860,10 @@
           <a:bodyPr/>
           <a:lstStyle/>
           <a:p>
-            <a:r>
-              <a:rPr lang="en-US" dirty="0"/>
-              <a:t>Please allow screenshare</a:t>
-            </a:r>
+            <a:pPr marL="0" indent="0">
+              <a:buNone/>
+            </a:pPr>
+            <a:endParaRPr lang="en-US" dirty="0"/>
           </a:p>
         </p:txBody>
       </p:sp>

</xml_diff>